<commit_message>
Added APIBuilder4Prometheus App - Removed Java-Impl.
</commit_message>
<xml_diff>
--- a/misc/documentation/apimanager-prometheus-exporter-overview.pptx
+++ b/misc/documentation/apimanager-prometheus-exporter-overview.pptx
@@ -6,6 +6,7 @@
   </p:sldMasterIdLst>
   <p:sldIdLst>
     <p:sldId id="256" r:id="rId2"/>
+    <p:sldId id="257" r:id="rId3"/>
   </p:sldIdLst>
   <p:sldSz cx="12192000" cy="6858000"/>
   <p:notesSz cx="6858000" cy="9144000"/>
@@ -104,6 +105,11 @@
       </a:defRPr>
     </a:lvl9pPr>
   </p:defaultTextStyle>
+  <p:extLst>
+    <p:ext uri="{EFAFB233-063F-42B5-8137-9DF3F51BA10A}">
+      <p15:sldGuideLst xmlns:p15="http://schemas.microsoft.com/office/powerpoint/2012/main"/>
+    </p:ext>
+  </p:extLst>
 </p:presentation>
 </file>
 
@@ -256,7 +262,7 @@
           <a:p>
             <a:fld id="{5D01E055-B396-453D-A97A-0DDF4A10555B}" type="datetimeFigureOut">
               <a:rPr lang="en-US" smtClean="0"/>
-              <a:t>8/5/2019</a:t>
+              <a:t>11/12/2021</a:t>
             </a:fld>
             <a:endParaRPr lang="en-US"/>
           </a:p>
@@ -456,7 +462,7 @@
           <a:p>
             <a:fld id="{5D01E055-B396-453D-A97A-0DDF4A10555B}" type="datetimeFigureOut">
               <a:rPr lang="en-US" smtClean="0"/>
-              <a:t>8/5/2019</a:t>
+              <a:t>11/12/2021</a:t>
             </a:fld>
             <a:endParaRPr lang="en-US"/>
           </a:p>
@@ -666,7 +672,7 @@
           <a:p>
             <a:fld id="{5D01E055-B396-453D-A97A-0DDF4A10555B}" type="datetimeFigureOut">
               <a:rPr lang="en-US" smtClean="0"/>
-              <a:t>8/5/2019</a:t>
+              <a:t>11/12/2021</a:t>
             </a:fld>
             <a:endParaRPr lang="en-US"/>
           </a:p>
@@ -866,7 +872,7 @@
           <a:p>
             <a:fld id="{5D01E055-B396-453D-A97A-0DDF4A10555B}" type="datetimeFigureOut">
               <a:rPr lang="en-US" smtClean="0"/>
-              <a:t>8/5/2019</a:t>
+              <a:t>11/12/2021</a:t>
             </a:fld>
             <a:endParaRPr lang="en-US"/>
           </a:p>
@@ -1142,7 +1148,7 @@
           <a:p>
             <a:fld id="{5D01E055-B396-453D-A97A-0DDF4A10555B}" type="datetimeFigureOut">
               <a:rPr lang="en-US" smtClean="0"/>
-              <a:t>8/5/2019</a:t>
+              <a:t>11/12/2021</a:t>
             </a:fld>
             <a:endParaRPr lang="en-US"/>
           </a:p>
@@ -1410,7 +1416,7 @@
           <a:p>
             <a:fld id="{5D01E055-B396-453D-A97A-0DDF4A10555B}" type="datetimeFigureOut">
               <a:rPr lang="en-US" smtClean="0"/>
-              <a:t>8/5/2019</a:t>
+              <a:t>11/12/2021</a:t>
             </a:fld>
             <a:endParaRPr lang="en-US"/>
           </a:p>
@@ -1825,7 +1831,7 @@
           <a:p>
             <a:fld id="{5D01E055-B396-453D-A97A-0DDF4A10555B}" type="datetimeFigureOut">
               <a:rPr lang="en-US" smtClean="0"/>
-              <a:t>8/5/2019</a:t>
+              <a:t>11/12/2021</a:t>
             </a:fld>
             <a:endParaRPr lang="en-US"/>
           </a:p>
@@ -1967,7 +1973,7 @@
           <a:p>
             <a:fld id="{5D01E055-B396-453D-A97A-0DDF4A10555B}" type="datetimeFigureOut">
               <a:rPr lang="en-US" smtClean="0"/>
-              <a:t>8/5/2019</a:t>
+              <a:t>11/12/2021</a:t>
             </a:fld>
             <a:endParaRPr lang="en-US"/>
           </a:p>
@@ -2080,7 +2086,7 @@
           <a:p>
             <a:fld id="{5D01E055-B396-453D-A97A-0DDF4A10555B}" type="datetimeFigureOut">
               <a:rPr lang="en-US" smtClean="0"/>
-              <a:t>8/5/2019</a:t>
+              <a:t>11/12/2021</a:t>
             </a:fld>
             <a:endParaRPr lang="en-US"/>
           </a:p>
@@ -2393,7 +2399,7 @@
           <a:p>
             <a:fld id="{5D01E055-B396-453D-A97A-0DDF4A10555B}" type="datetimeFigureOut">
               <a:rPr lang="en-US" smtClean="0"/>
-              <a:t>8/5/2019</a:t>
+              <a:t>11/12/2021</a:t>
             </a:fld>
             <a:endParaRPr lang="en-US"/>
           </a:p>
@@ -2682,7 +2688,7 @@
           <a:p>
             <a:fld id="{5D01E055-B396-453D-A97A-0DDF4A10555B}" type="datetimeFigureOut">
               <a:rPr lang="en-US" smtClean="0"/>
-              <a:t>8/5/2019</a:t>
+              <a:t>11/12/2021</a:t>
             </a:fld>
             <a:endParaRPr lang="en-US"/>
           </a:p>
@@ -2925,7 +2931,7 @@
           <a:p>
             <a:fld id="{5D01E055-B396-453D-A97A-0DDF4A10555B}" type="datetimeFigureOut">
               <a:rPr lang="en-US" smtClean="0"/>
-              <a:t>8/5/2019</a:t>
+              <a:t>11/12/2021</a:t>
             </a:fld>
             <a:endParaRPr lang="en-US"/>
           </a:p>
@@ -4341,6 +4347,1563 @@
 </p:sld>
 </file>
 
+<file path=ppt/slides/slide2.xml><?xml version="1.0" encoding="utf-8"?>
+<p:sld xmlns:a="http://schemas.openxmlformats.org/drawingml/2006/main" xmlns:r="http://schemas.openxmlformats.org/officeDocument/2006/relationships" xmlns:p="http://schemas.openxmlformats.org/presentationml/2006/main">
+  <p:cSld>
+    <p:spTree>
+      <p:nvGrpSpPr>
+        <p:cNvPr id="1" name=""/>
+        <p:cNvGrpSpPr/>
+        <p:nvPr/>
+      </p:nvGrpSpPr>
+      <p:grpSpPr>
+        <a:xfrm>
+          <a:off x="0" y="0"/>
+          <a:ext cx="0" cy="0"/>
+          <a:chOff x="0" y="0"/>
+          <a:chExt cx="0" cy="0"/>
+        </a:xfrm>
+      </p:grpSpPr>
+      <p:sp>
+        <p:nvSpPr>
+          <p:cNvPr id="4" name="Rechteck: abgerundete Ecken 3">
+            <a:extLst>
+              <a:ext uri="{FF2B5EF4-FFF2-40B4-BE49-F238E27FC236}">
+                <a16:creationId xmlns:a16="http://schemas.microsoft.com/office/drawing/2014/main" id="{D7F813EC-7172-47DF-AB53-CFE211DEB3AC}"/>
+              </a:ext>
+            </a:extLst>
+          </p:cNvPr>
+          <p:cNvSpPr/>
+          <p:nvPr/>
+        </p:nvSpPr>
+        <p:spPr>
+          <a:xfrm>
+            <a:off x="1307428" y="1973180"/>
+            <a:ext cx="1179094" cy="1203157"/>
+          </a:xfrm>
+          <a:prstGeom prst="roundRect">
+            <a:avLst>
+              <a:gd name="adj" fmla="val 6569"/>
+            </a:avLst>
+          </a:prstGeom>
+          <a:solidFill>
+            <a:schemeClr val="bg1">
+              <a:lumMod val="95000"/>
+            </a:schemeClr>
+          </a:solidFill>
+          <a:ln w="9525" cap="flat" cmpd="sng" algn="ctr">
+            <a:solidFill>
+              <a:schemeClr val="dk1"/>
+            </a:solidFill>
+            <a:prstDash val="solid"/>
+            <a:round/>
+            <a:headEnd type="none" w="med" len="med"/>
+            <a:tailEnd type="none" w="med" len="med"/>
+          </a:ln>
+        </p:spPr>
+        <p:style>
+          <a:lnRef idx="0">
+            <a:scrgbClr r="0" g="0" b="0"/>
+          </a:lnRef>
+          <a:fillRef idx="0">
+            <a:scrgbClr r="0" g="0" b="0"/>
+          </a:fillRef>
+          <a:effectRef idx="0">
+            <a:scrgbClr r="0" g="0" b="0"/>
+          </a:effectRef>
+          <a:fontRef idx="minor">
+            <a:schemeClr val="dk1"/>
+          </a:fontRef>
+        </p:style>
+        <p:txBody>
+          <a:bodyPr rot="0" spcFirstLastPara="0" vertOverflow="overflow" horzOverflow="overflow" vert="horz" wrap="square" lIns="91440" tIns="45720" rIns="91440" bIns="45720" numCol="1" spcCol="0" rtlCol="0" fromWordArt="0" anchor="ctr" anchorCtr="0" forceAA="0" compatLnSpc="1">
+            <a:prstTxWarp prst="textNoShape">
+              <a:avLst/>
+            </a:prstTxWarp>
+            <a:noAutofit/>
+          </a:bodyPr>
+          <a:lstStyle/>
+          <a:p>
+            <a:pPr marL="0" marR="0" lvl="0" indent="0" algn="ctr" defTabSz="914400" rtl="0" eaLnBrk="1" fontAlgn="auto" latinLnBrk="0" hangingPunct="1">
+              <a:lnSpc>
+                <a:spcPct val="100000"/>
+              </a:lnSpc>
+              <a:spcBef>
+                <a:spcPts val="0"/>
+              </a:spcBef>
+              <a:spcAft>
+                <a:spcPts val="0"/>
+              </a:spcAft>
+              <a:buClrTx/>
+              <a:buSzTx/>
+              <a:buFontTx/>
+              <a:buNone/>
+              <a:tabLst/>
+              <a:defRPr/>
+            </a:pPr>
+            <a:r>
+              <a:rPr kumimoji="0" lang="de-DE" sz="1200" b="1" i="0" u="none" strike="noStrike" kern="1200" cap="none" spc="0" normalizeH="0" baseline="0" noProof="0" dirty="0">
+                <a:ln>
+                  <a:noFill/>
+                </a:ln>
+                <a:solidFill>
+                  <a:prstClr val="black"/>
+                </a:solidFill>
+                <a:effectLst/>
+                <a:uLnTx/>
+                <a:uFillTx/>
+                <a:latin typeface="Calibri" panose="020F0502020204030204"/>
+                <a:ea typeface="+mn-ea"/>
+                <a:cs typeface="+mn-cs"/>
+              </a:rPr>
+              <a:t>Axway</a:t>
+            </a:r>
+            <a:br>
+              <a:rPr kumimoji="0" lang="de-DE" sz="1200" b="1" i="0" u="none" strike="noStrike" kern="1200" cap="none" spc="0" normalizeH="0" baseline="0" noProof="0" dirty="0">
+                <a:ln>
+                  <a:noFill/>
+                </a:ln>
+                <a:solidFill>
+                  <a:prstClr val="black"/>
+                </a:solidFill>
+                <a:effectLst/>
+                <a:uLnTx/>
+                <a:uFillTx/>
+                <a:latin typeface="Calibri" panose="020F0502020204030204"/>
+                <a:ea typeface="+mn-ea"/>
+                <a:cs typeface="+mn-cs"/>
+              </a:rPr>
+            </a:br>
+            <a:r>
+              <a:rPr kumimoji="0" lang="de-DE" sz="1200" b="1" i="0" u="none" strike="noStrike" kern="1200" cap="none" spc="0" normalizeH="0" baseline="0" noProof="0" dirty="0">
+                <a:ln>
+                  <a:noFill/>
+                </a:ln>
+                <a:solidFill>
+                  <a:prstClr val="black"/>
+                </a:solidFill>
+                <a:effectLst/>
+                <a:uLnTx/>
+                <a:uFillTx/>
+                <a:latin typeface="Calibri" panose="020F0502020204030204"/>
+                <a:ea typeface="+mn-ea"/>
+                <a:cs typeface="+mn-cs"/>
+              </a:rPr>
+              <a:t>API-Gateway</a:t>
+            </a:r>
+          </a:p>
+          <a:p>
+            <a:pPr marL="0" marR="0" lvl="0" indent="0" algn="ctr" defTabSz="914400" rtl="0" eaLnBrk="1" fontAlgn="auto" latinLnBrk="0" hangingPunct="1">
+              <a:lnSpc>
+                <a:spcPct val="100000"/>
+              </a:lnSpc>
+              <a:spcBef>
+                <a:spcPts val="0"/>
+              </a:spcBef>
+              <a:spcAft>
+                <a:spcPts val="0"/>
+              </a:spcAft>
+              <a:buClrTx/>
+              <a:buSzTx/>
+              <a:buFontTx/>
+              <a:buNone/>
+              <a:tabLst/>
+              <a:defRPr/>
+            </a:pPr>
+            <a:r>
+              <a:rPr kumimoji="0" lang="de-DE" sz="1050" b="0" i="0" u="none" strike="noStrike" kern="1200" cap="none" spc="0" normalizeH="0" baseline="0" noProof="0" dirty="0">
+                <a:ln>
+                  <a:noFill/>
+                </a:ln>
+                <a:solidFill>
+                  <a:prstClr val="black"/>
+                </a:solidFill>
+                <a:effectLst/>
+                <a:uLnTx/>
+                <a:uFillTx/>
+                <a:latin typeface="Calibri" panose="020F0502020204030204"/>
+                <a:ea typeface="+mn-ea"/>
+                <a:cs typeface="+mn-cs"/>
+              </a:rPr>
+              <a:t>Instance 1</a:t>
+            </a:r>
+            <a:endParaRPr kumimoji="0" lang="en-US" sz="1050" b="0" i="0" u="none" strike="noStrike" kern="1200" cap="none" spc="0" normalizeH="0" baseline="0" noProof="0" dirty="0">
+              <a:ln>
+                <a:noFill/>
+              </a:ln>
+              <a:solidFill>
+                <a:prstClr val="black"/>
+              </a:solidFill>
+              <a:effectLst/>
+              <a:uLnTx/>
+              <a:uFillTx/>
+              <a:latin typeface="Calibri" panose="020F0502020204030204"/>
+              <a:ea typeface="+mn-ea"/>
+              <a:cs typeface="+mn-cs"/>
+            </a:endParaRPr>
+          </a:p>
+        </p:txBody>
+      </p:sp>
+      <p:sp>
+        <p:nvSpPr>
+          <p:cNvPr id="5" name="Rechteck: abgerundete Ecken 4">
+            <a:extLst>
+              <a:ext uri="{FF2B5EF4-FFF2-40B4-BE49-F238E27FC236}">
+                <a16:creationId xmlns:a16="http://schemas.microsoft.com/office/drawing/2014/main" id="{2C68AFF8-20A2-4123-84C9-2EDEE33D7A00}"/>
+              </a:ext>
+            </a:extLst>
+          </p:cNvPr>
+          <p:cNvSpPr/>
+          <p:nvPr/>
+        </p:nvSpPr>
+        <p:spPr>
+          <a:xfrm>
+            <a:off x="1307428" y="3424990"/>
+            <a:ext cx="1179094" cy="1203157"/>
+          </a:xfrm>
+          <a:prstGeom prst="roundRect">
+            <a:avLst>
+              <a:gd name="adj" fmla="val 5761"/>
+            </a:avLst>
+          </a:prstGeom>
+          <a:solidFill>
+            <a:schemeClr val="bg1">
+              <a:lumMod val="95000"/>
+            </a:schemeClr>
+          </a:solidFill>
+          <a:ln w="9525" cap="flat" cmpd="sng" algn="ctr">
+            <a:solidFill>
+              <a:schemeClr val="dk1"/>
+            </a:solidFill>
+            <a:prstDash val="solid"/>
+            <a:round/>
+            <a:headEnd type="none" w="med" len="med"/>
+            <a:tailEnd type="none" w="med" len="med"/>
+          </a:ln>
+        </p:spPr>
+        <p:style>
+          <a:lnRef idx="0">
+            <a:scrgbClr r="0" g="0" b="0"/>
+          </a:lnRef>
+          <a:fillRef idx="0">
+            <a:scrgbClr r="0" g="0" b="0"/>
+          </a:fillRef>
+          <a:effectRef idx="0">
+            <a:scrgbClr r="0" g="0" b="0"/>
+          </a:effectRef>
+          <a:fontRef idx="minor">
+            <a:schemeClr val="dk1"/>
+          </a:fontRef>
+        </p:style>
+        <p:txBody>
+          <a:bodyPr rot="0" spcFirstLastPara="0" vertOverflow="overflow" horzOverflow="overflow" vert="horz" wrap="square" lIns="91440" tIns="45720" rIns="91440" bIns="45720" numCol="1" spcCol="0" rtlCol="0" fromWordArt="0" anchor="ctr" anchorCtr="0" forceAA="0" compatLnSpc="1">
+            <a:prstTxWarp prst="textNoShape">
+              <a:avLst/>
+            </a:prstTxWarp>
+            <a:noAutofit/>
+          </a:bodyPr>
+          <a:lstStyle/>
+          <a:p>
+            <a:pPr marL="0" marR="0" lvl="0" indent="0" algn="ctr" defTabSz="914400" rtl="0" eaLnBrk="1" fontAlgn="auto" latinLnBrk="0" hangingPunct="1">
+              <a:lnSpc>
+                <a:spcPct val="100000"/>
+              </a:lnSpc>
+              <a:spcBef>
+                <a:spcPts val="0"/>
+              </a:spcBef>
+              <a:spcAft>
+                <a:spcPts val="0"/>
+              </a:spcAft>
+              <a:buClrTx/>
+              <a:buSzTx/>
+              <a:buFontTx/>
+              <a:buNone/>
+              <a:tabLst/>
+              <a:defRPr/>
+            </a:pPr>
+            <a:r>
+              <a:rPr kumimoji="0" lang="de-DE" sz="1200" b="1" i="0" u="none" strike="noStrike" kern="1200" cap="none" spc="0" normalizeH="0" baseline="0" noProof="0" dirty="0">
+                <a:ln>
+                  <a:noFill/>
+                </a:ln>
+                <a:solidFill>
+                  <a:prstClr val="black"/>
+                </a:solidFill>
+                <a:effectLst/>
+                <a:uLnTx/>
+                <a:uFillTx/>
+                <a:latin typeface="Calibri" panose="020F0502020204030204"/>
+                <a:ea typeface="+mn-ea"/>
+                <a:cs typeface="+mn-cs"/>
+              </a:rPr>
+              <a:t>Axway</a:t>
+            </a:r>
+            <a:br>
+              <a:rPr kumimoji="0" lang="de-DE" sz="1200" b="1" i="0" u="none" strike="noStrike" kern="1200" cap="none" spc="0" normalizeH="0" baseline="0" noProof="0" dirty="0">
+                <a:ln>
+                  <a:noFill/>
+                </a:ln>
+                <a:solidFill>
+                  <a:prstClr val="black"/>
+                </a:solidFill>
+                <a:effectLst/>
+                <a:uLnTx/>
+                <a:uFillTx/>
+                <a:latin typeface="Calibri" panose="020F0502020204030204"/>
+                <a:ea typeface="+mn-ea"/>
+                <a:cs typeface="+mn-cs"/>
+              </a:rPr>
+            </a:br>
+            <a:r>
+              <a:rPr kumimoji="0" lang="de-DE" sz="1200" b="1" i="0" u="none" strike="noStrike" kern="1200" cap="none" spc="0" normalizeH="0" baseline="0" noProof="0" dirty="0">
+                <a:ln>
+                  <a:noFill/>
+                </a:ln>
+                <a:solidFill>
+                  <a:prstClr val="black"/>
+                </a:solidFill>
+                <a:effectLst/>
+                <a:uLnTx/>
+                <a:uFillTx/>
+                <a:latin typeface="Calibri" panose="020F0502020204030204"/>
+                <a:ea typeface="+mn-ea"/>
+                <a:cs typeface="+mn-cs"/>
+              </a:rPr>
+              <a:t>API-Gateway</a:t>
+            </a:r>
+          </a:p>
+          <a:p>
+            <a:pPr marL="0" marR="0" lvl="0" indent="0" algn="ctr" defTabSz="914400" rtl="0" eaLnBrk="1" fontAlgn="auto" latinLnBrk="0" hangingPunct="1">
+              <a:lnSpc>
+                <a:spcPct val="100000"/>
+              </a:lnSpc>
+              <a:spcBef>
+                <a:spcPts val="0"/>
+              </a:spcBef>
+              <a:spcAft>
+                <a:spcPts val="0"/>
+              </a:spcAft>
+              <a:buClrTx/>
+              <a:buSzTx/>
+              <a:buFontTx/>
+              <a:buNone/>
+              <a:tabLst/>
+              <a:defRPr/>
+            </a:pPr>
+            <a:r>
+              <a:rPr kumimoji="0" lang="de-DE" sz="1050" b="0" i="0" u="none" strike="noStrike" kern="1200" cap="none" spc="0" normalizeH="0" baseline="0" noProof="0" dirty="0">
+                <a:ln>
+                  <a:noFill/>
+                </a:ln>
+                <a:solidFill>
+                  <a:prstClr val="black"/>
+                </a:solidFill>
+                <a:effectLst/>
+                <a:uLnTx/>
+                <a:uFillTx/>
+                <a:latin typeface="Calibri" panose="020F0502020204030204"/>
+                <a:ea typeface="+mn-ea"/>
+                <a:cs typeface="+mn-cs"/>
+              </a:rPr>
+              <a:t>Instance 2</a:t>
+            </a:r>
+            <a:endParaRPr kumimoji="0" lang="en-US" sz="1050" b="0" i="0" u="none" strike="noStrike" kern="1200" cap="none" spc="0" normalizeH="0" baseline="0" noProof="0" dirty="0">
+              <a:ln>
+                <a:noFill/>
+              </a:ln>
+              <a:solidFill>
+                <a:prstClr val="black"/>
+              </a:solidFill>
+              <a:effectLst/>
+              <a:uLnTx/>
+              <a:uFillTx/>
+              <a:latin typeface="Calibri" panose="020F0502020204030204"/>
+              <a:ea typeface="+mn-ea"/>
+              <a:cs typeface="+mn-cs"/>
+            </a:endParaRPr>
+          </a:p>
+        </p:txBody>
+      </p:sp>
+      <p:sp>
+        <p:nvSpPr>
+          <p:cNvPr id="7" name="Rechteck: abgerundete Ecken 6">
+            <a:extLst>
+              <a:ext uri="{FF2B5EF4-FFF2-40B4-BE49-F238E27FC236}">
+                <a16:creationId xmlns:a16="http://schemas.microsoft.com/office/drawing/2014/main" id="{A5B4CC1A-3244-494A-99E5-5D40F59A1870}"/>
+              </a:ext>
+            </a:extLst>
+          </p:cNvPr>
+          <p:cNvSpPr/>
+          <p:nvPr/>
+        </p:nvSpPr>
+        <p:spPr>
+          <a:xfrm>
+            <a:off x="5506453" y="2720363"/>
+            <a:ext cx="1179094" cy="1203157"/>
+          </a:xfrm>
+          <a:prstGeom prst="roundRect">
+            <a:avLst>
+              <a:gd name="adj" fmla="val 6569"/>
+            </a:avLst>
+          </a:prstGeom>
+          <a:solidFill>
+            <a:schemeClr val="bg1">
+              <a:lumMod val="95000"/>
+            </a:schemeClr>
+          </a:solidFill>
+          <a:ln w="9525" cap="flat" cmpd="sng" algn="ctr">
+            <a:solidFill>
+              <a:schemeClr val="dk1"/>
+            </a:solidFill>
+            <a:prstDash val="solid"/>
+            <a:round/>
+            <a:headEnd type="none" w="med" len="med"/>
+            <a:tailEnd type="none" w="med" len="med"/>
+          </a:ln>
+        </p:spPr>
+        <p:style>
+          <a:lnRef idx="0">
+            <a:scrgbClr r="0" g="0" b="0"/>
+          </a:lnRef>
+          <a:fillRef idx="0">
+            <a:scrgbClr r="0" g="0" b="0"/>
+          </a:fillRef>
+          <a:effectRef idx="0">
+            <a:scrgbClr r="0" g="0" b="0"/>
+          </a:effectRef>
+          <a:fontRef idx="minor">
+            <a:schemeClr val="dk1"/>
+          </a:fontRef>
+        </p:style>
+        <p:txBody>
+          <a:bodyPr rot="0" spcFirstLastPara="0" vertOverflow="overflow" horzOverflow="overflow" vert="horz" wrap="square" lIns="91440" tIns="45720" rIns="91440" bIns="45720" numCol="1" spcCol="0" rtlCol="0" fromWordArt="0" anchor="ctr" anchorCtr="0" forceAA="0" compatLnSpc="1">
+            <a:prstTxWarp prst="textNoShape">
+              <a:avLst/>
+            </a:prstTxWarp>
+            <a:noAutofit/>
+          </a:bodyPr>
+          <a:lstStyle/>
+          <a:p>
+            <a:pPr marL="0" marR="0" lvl="0" indent="0" algn="ctr" defTabSz="914400" rtl="0" eaLnBrk="1" fontAlgn="auto" latinLnBrk="0" hangingPunct="1">
+              <a:lnSpc>
+                <a:spcPct val="100000"/>
+              </a:lnSpc>
+              <a:spcBef>
+                <a:spcPts val="0"/>
+              </a:spcBef>
+              <a:spcAft>
+                <a:spcPts val="0"/>
+              </a:spcAft>
+              <a:buClrTx/>
+              <a:buSzTx/>
+              <a:buFontTx/>
+              <a:buNone/>
+              <a:tabLst/>
+              <a:defRPr/>
+            </a:pPr>
+            <a:r>
+              <a:rPr kumimoji="0" lang="de-DE" sz="1200" b="1" i="0" u="none" strike="noStrike" kern="1200" cap="none" spc="0" normalizeH="0" baseline="0" noProof="0" dirty="0">
+                <a:ln>
+                  <a:noFill/>
+                </a:ln>
+                <a:solidFill>
+                  <a:prstClr val="black"/>
+                </a:solidFill>
+                <a:effectLst/>
+                <a:uLnTx/>
+                <a:uFillTx/>
+                <a:latin typeface="Calibri" panose="020F0502020204030204"/>
+                <a:ea typeface="+mn-ea"/>
+                <a:cs typeface="+mn-cs"/>
+              </a:rPr>
+              <a:t>Prometheus </a:t>
+            </a:r>
+            <a:r>
+              <a:rPr kumimoji="0" lang="de-DE" sz="1200" b="1" i="0" u="none" strike="noStrike" kern="1200" cap="none" spc="0" normalizeH="0" baseline="0" noProof="0" dirty="0" err="1">
+                <a:ln>
+                  <a:noFill/>
+                </a:ln>
+                <a:solidFill>
+                  <a:prstClr val="black"/>
+                </a:solidFill>
+                <a:effectLst/>
+                <a:uLnTx/>
+                <a:uFillTx/>
+                <a:latin typeface="Calibri" panose="020F0502020204030204"/>
+                <a:ea typeface="+mn-ea"/>
+                <a:cs typeface="+mn-cs"/>
+              </a:rPr>
+              <a:t>Exporter</a:t>
+            </a:r>
+            <a:br>
+              <a:rPr kumimoji="0" lang="de-DE" sz="1050" b="0" i="0" u="none" strike="noStrike" kern="1200" cap="none" spc="0" normalizeH="0" baseline="0" noProof="0" dirty="0">
+                <a:ln>
+                  <a:noFill/>
+                </a:ln>
+                <a:solidFill>
+                  <a:prstClr val="black"/>
+                </a:solidFill>
+                <a:effectLst/>
+                <a:uLnTx/>
+                <a:uFillTx/>
+                <a:latin typeface="Calibri" panose="020F0502020204030204"/>
+                <a:ea typeface="+mn-ea"/>
+                <a:cs typeface="+mn-cs"/>
+              </a:rPr>
+            </a:br>
+            <a:r>
+              <a:rPr kumimoji="0" lang="de-DE" sz="1050" b="0" i="0" u="none" strike="noStrike" kern="1200" cap="none" spc="0" normalizeH="0" baseline="0" noProof="0" dirty="0">
+                <a:ln>
+                  <a:noFill/>
+                </a:ln>
+                <a:solidFill>
+                  <a:prstClr val="black"/>
+                </a:solidFill>
+                <a:effectLst/>
+                <a:uLnTx/>
+                <a:uFillTx/>
+                <a:latin typeface="Calibri" panose="020F0502020204030204"/>
+                <a:ea typeface="+mn-ea"/>
+                <a:cs typeface="+mn-cs"/>
+              </a:rPr>
+              <a:t>Docker</a:t>
+            </a:r>
+            <a:endParaRPr kumimoji="0" lang="en-US" sz="1050" b="0" i="0" u="none" strike="noStrike" kern="1200" cap="none" spc="0" normalizeH="0" baseline="0" noProof="0" dirty="0">
+              <a:ln>
+                <a:noFill/>
+              </a:ln>
+              <a:solidFill>
+                <a:prstClr val="black"/>
+              </a:solidFill>
+              <a:effectLst/>
+              <a:uLnTx/>
+              <a:uFillTx/>
+              <a:latin typeface="Calibri" panose="020F0502020204030204"/>
+              <a:ea typeface="+mn-ea"/>
+              <a:cs typeface="+mn-cs"/>
+            </a:endParaRPr>
+          </a:p>
+        </p:txBody>
+      </p:sp>
+      <p:cxnSp>
+        <p:nvCxnSpPr>
+          <p:cNvPr id="9" name="Gerade Verbindung mit Pfeil 8">
+            <a:extLst>
+              <a:ext uri="{FF2B5EF4-FFF2-40B4-BE49-F238E27FC236}">
+                <a16:creationId xmlns:a16="http://schemas.microsoft.com/office/drawing/2014/main" id="{2D54B943-2A7A-488D-ABCF-CC7AA35E2EA5}"/>
+              </a:ext>
+            </a:extLst>
+          </p:cNvPr>
+          <p:cNvCxnSpPr>
+            <a:cxnSpLocks/>
+            <a:stCxn id="23" idx="1"/>
+            <a:endCxn id="4" idx="3"/>
+          </p:cNvCxnSpPr>
+          <p:nvPr/>
+        </p:nvCxnSpPr>
+        <p:spPr>
+          <a:xfrm flipH="1" flipV="1">
+            <a:off x="2486522" y="2574759"/>
+            <a:ext cx="717788" cy="747183"/>
+          </a:xfrm>
+          <a:prstGeom prst="straightConnector1">
+            <a:avLst/>
+          </a:prstGeom>
+          <a:ln>
+            <a:tailEnd type="triangle"/>
+          </a:ln>
+        </p:spPr>
+        <p:style>
+          <a:lnRef idx="1">
+            <a:schemeClr val="dk1"/>
+          </a:lnRef>
+          <a:fillRef idx="0">
+            <a:schemeClr val="dk1"/>
+          </a:fillRef>
+          <a:effectRef idx="0">
+            <a:schemeClr val="dk1"/>
+          </a:effectRef>
+          <a:fontRef idx="minor">
+            <a:schemeClr val="tx1"/>
+          </a:fontRef>
+        </p:style>
+      </p:cxnSp>
+      <p:sp>
+        <p:nvSpPr>
+          <p:cNvPr id="10" name="Textfeld 9">
+            <a:extLst>
+              <a:ext uri="{FF2B5EF4-FFF2-40B4-BE49-F238E27FC236}">
+                <a16:creationId xmlns:a16="http://schemas.microsoft.com/office/drawing/2014/main" id="{9003AEAA-E6E8-40CC-984B-2D4091D24FE2}"/>
+              </a:ext>
+            </a:extLst>
+          </p:cNvPr>
+          <p:cNvSpPr txBox="1"/>
+          <p:nvPr/>
+        </p:nvSpPr>
+        <p:spPr>
+          <a:xfrm rot="2700000">
+            <a:off x="2521105" y="2716961"/>
+            <a:ext cx="686304" cy="253916"/>
+          </a:xfrm>
+          <a:prstGeom prst="rect">
+            <a:avLst/>
+          </a:prstGeom>
+          <a:noFill/>
+        </p:spPr>
+        <p:txBody>
+          <a:bodyPr wrap="square" rtlCol="0">
+            <a:spAutoFit/>
+          </a:bodyPr>
+          <a:lstStyle/>
+          <a:p>
+            <a:pPr marL="0" marR="0" lvl="0" indent="0" algn="ctr" defTabSz="914400" rtl="0" eaLnBrk="1" fontAlgn="auto" latinLnBrk="0" hangingPunct="1">
+              <a:lnSpc>
+                <a:spcPct val="100000"/>
+              </a:lnSpc>
+              <a:spcBef>
+                <a:spcPts val="0"/>
+              </a:spcBef>
+              <a:spcAft>
+                <a:spcPts val="0"/>
+              </a:spcAft>
+              <a:buClrTx/>
+              <a:buSzTx/>
+              <a:buFontTx/>
+              <a:buNone/>
+              <a:tabLst/>
+              <a:defRPr/>
+            </a:pPr>
+            <a:r>
+              <a:rPr kumimoji="0" lang="de-DE" sz="1050" b="0" i="0" u="none" strike="noStrike" kern="1200" cap="none" spc="0" normalizeH="0" baseline="0" noProof="0" dirty="0">
+                <a:ln>
+                  <a:noFill/>
+                </a:ln>
+                <a:solidFill>
+                  <a:prstClr val="black"/>
+                </a:solidFill>
+                <a:effectLst/>
+                <a:uLnTx/>
+                <a:uFillTx/>
+                <a:latin typeface="Calibri" panose="020F0502020204030204"/>
+                <a:ea typeface="+mn-ea"/>
+                <a:cs typeface="+mn-cs"/>
+              </a:rPr>
+              <a:t>HTTPS</a:t>
+            </a:r>
+            <a:endParaRPr kumimoji="0" lang="en-US" sz="1050" b="0" i="0" u="none" strike="noStrike" kern="1200" cap="none" spc="0" normalizeH="0" baseline="0" noProof="0" dirty="0">
+              <a:ln>
+                <a:noFill/>
+              </a:ln>
+              <a:solidFill>
+                <a:prstClr val="black"/>
+              </a:solidFill>
+              <a:effectLst/>
+              <a:uLnTx/>
+              <a:uFillTx/>
+              <a:latin typeface="Calibri" panose="020F0502020204030204"/>
+              <a:ea typeface="+mn-ea"/>
+              <a:cs typeface="+mn-cs"/>
+            </a:endParaRPr>
+          </a:p>
+        </p:txBody>
+      </p:sp>
+      <p:cxnSp>
+        <p:nvCxnSpPr>
+          <p:cNvPr id="11" name="Gerade Verbindung mit Pfeil 10">
+            <a:extLst>
+              <a:ext uri="{FF2B5EF4-FFF2-40B4-BE49-F238E27FC236}">
+                <a16:creationId xmlns:a16="http://schemas.microsoft.com/office/drawing/2014/main" id="{9EF10DBE-8C8F-4F41-870C-BB8B0557CAA0}"/>
+              </a:ext>
+            </a:extLst>
+          </p:cNvPr>
+          <p:cNvCxnSpPr>
+            <a:cxnSpLocks/>
+            <a:stCxn id="23" idx="3"/>
+            <a:endCxn id="7" idx="1"/>
+          </p:cNvCxnSpPr>
+          <p:nvPr/>
+        </p:nvCxnSpPr>
+        <p:spPr>
+          <a:xfrm>
+            <a:off x="4383404" y="3321942"/>
+            <a:ext cx="1123049" cy="0"/>
+          </a:xfrm>
+          <a:prstGeom prst="straightConnector1">
+            <a:avLst/>
+          </a:prstGeom>
+          <a:ln>
+            <a:headEnd type="triangle"/>
+            <a:tailEnd type="none"/>
+          </a:ln>
+        </p:spPr>
+        <p:style>
+          <a:lnRef idx="1">
+            <a:schemeClr val="dk1"/>
+          </a:lnRef>
+          <a:fillRef idx="0">
+            <a:schemeClr val="dk1"/>
+          </a:fillRef>
+          <a:effectRef idx="0">
+            <a:schemeClr val="dk1"/>
+          </a:effectRef>
+          <a:fontRef idx="minor">
+            <a:schemeClr val="tx1"/>
+          </a:fontRef>
+        </p:style>
+      </p:cxnSp>
+      <p:sp>
+        <p:nvSpPr>
+          <p:cNvPr id="12" name="Textfeld 11">
+            <a:extLst>
+              <a:ext uri="{FF2B5EF4-FFF2-40B4-BE49-F238E27FC236}">
+                <a16:creationId xmlns:a16="http://schemas.microsoft.com/office/drawing/2014/main" id="{DAAD2EB5-6527-4EA3-8DBA-DBB91E6D25BB}"/>
+              </a:ext>
+            </a:extLst>
+          </p:cNvPr>
+          <p:cNvSpPr txBox="1"/>
+          <p:nvPr/>
+        </p:nvSpPr>
+        <p:spPr>
+          <a:xfrm>
+            <a:off x="4390293" y="3102944"/>
+            <a:ext cx="1100890" cy="253916"/>
+          </a:xfrm>
+          <a:prstGeom prst="rect">
+            <a:avLst/>
+          </a:prstGeom>
+          <a:noFill/>
+        </p:spPr>
+        <p:txBody>
+          <a:bodyPr wrap="square" rtlCol="0">
+            <a:spAutoFit/>
+          </a:bodyPr>
+          <a:lstStyle/>
+          <a:p>
+            <a:pPr marL="0" marR="0" lvl="0" indent="0" algn="ctr" defTabSz="914400" rtl="0" eaLnBrk="1" fontAlgn="auto" latinLnBrk="0" hangingPunct="1">
+              <a:lnSpc>
+                <a:spcPct val="100000"/>
+              </a:lnSpc>
+              <a:spcBef>
+                <a:spcPts val="0"/>
+              </a:spcBef>
+              <a:spcAft>
+                <a:spcPts val="0"/>
+              </a:spcAft>
+              <a:buClrTx/>
+              <a:buSzTx/>
+              <a:buFontTx/>
+              <a:buNone/>
+              <a:tabLst/>
+              <a:defRPr/>
+            </a:pPr>
+            <a:r>
+              <a:rPr kumimoji="0" lang="de-DE" sz="1050" b="0" i="0" u="none" strike="noStrike" kern="1200" cap="none" spc="0" normalizeH="0" baseline="0" noProof="0" dirty="0">
+                <a:ln>
+                  <a:noFill/>
+                </a:ln>
+                <a:solidFill>
+                  <a:prstClr val="black"/>
+                </a:solidFill>
+                <a:effectLst/>
+                <a:uLnTx/>
+                <a:uFillTx/>
+                <a:latin typeface="Calibri" panose="020F0502020204030204"/>
+                <a:ea typeface="+mn-ea"/>
+                <a:cs typeface="+mn-cs"/>
+              </a:rPr>
+              <a:t>HTTPS</a:t>
+            </a:r>
+          </a:p>
+        </p:txBody>
+      </p:sp>
+      <p:sp>
+        <p:nvSpPr>
+          <p:cNvPr id="16" name="Rechteck: abgerundete Ecken 15">
+            <a:extLst>
+              <a:ext uri="{FF2B5EF4-FFF2-40B4-BE49-F238E27FC236}">
+                <a16:creationId xmlns:a16="http://schemas.microsoft.com/office/drawing/2014/main" id="{ECA99C3A-2B9A-4BC8-B047-3BE392578B0B}"/>
+              </a:ext>
+            </a:extLst>
+          </p:cNvPr>
+          <p:cNvSpPr/>
+          <p:nvPr/>
+        </p:nvSpPr>
+        <p:spPr>
+          <a:xfrm>
+            <a:off x="7613986" y="2715127"/>
+            <a:ext cx="1179094" cy="1203157"/>
+          </a:xfrm>
+          <a:prstGeom prst="roundRect">
+            <a:avLst>
+              <a:gd name="adj" fmla="val 5783"/>
+            </a:avLst>
+          </a:prstGeom>
+          <a:solidFill>
+            <a:schemeClr val="bg1">
+              <a:lumMod val="95000"/>
+            </a:schemeClr>
+          </a:solidFill>
+          <a:ln w="9525" cap="flat" cmpd="sng" algn="ctr">
+            <a:solidFill>
+              <a:schemeClr val="dk1"/>
+            </a:solidFill>
+            <a:prstDash val="solid"/>
+            <a:round/>
+            <a:headEnd type="none" w="med" len="med"/>
+            <a:tailEnd type="none" w="med" len="med"/>
+          </a:ln>
+        </p:spPr>
+        <p:style>
+          <a:lnRef idx="0">
+            <a:scrgbClr r="0" g="0" b="0"/>
+          </a:lnRef>
+          <a:fillRef idx="0">
+            <a:scrgbClr r="0" g="0" b="0"/>
+          </a:fillRef>
+          <a:effectRef idx="0">
+            <a:scrgbClr r="0" g="0" b="0"/>
+          </a:effectRef>
+          <a:fontRef idx="minor">
+            <a:schemeClr val="dk1"/>
+          </a:fontRef>
+        </p:style>
+        <p:txBody>
+          <a:bodyPr rot="0" spcFirstLastPara="0" vertOverflow="overflow" horzOverflow="overflow" vert="horz" wrap="square" lIns="91440" tIns="45720" rIns="91440" bIns="45720" numCol="1" spcCol="0" rtlCol="0" fromWordArt="0" anchor="ctr" anchorCtr="0" forceAA="0" compatLnSpc="1">
+            <a:prstTxWarp prst="textNoShape">
+              <a:avLst/>
+            </a:prstTxWarp>
+            <a:noAutofit/>
+          </a:bodyPr>
+          <a:lstStyle/>
+          <a:p>
+            <a:pPr marL="0" marR="0" lvl="0" indent="0" algn="ctr" defTabSz="914400" rtl="0" eaLnBrk="1" fontAlgn="auto" latinLnBrk="0" hangingPunct="1">
+              <a:lnSpc>
+                <a:spcPct val="100000"/>
+              </a:lnSpc>
+              <a:spcBef>
+                <a:spcPts val="0"/>
+              </a:spcBef>
+              <a:spcAft>
+                <a:spcPts val="0"/>
+              </a:spcAft>
+              <a:buClrTx/>
+              <a:buSzTx/>
+              <a:buFontTx/>
+              <a:buNone/>
+              <a:tabLst/>
+              <a:defRPr/>
+            </a:pPr>
+            <a:endParaRPr kumimoji="0" lang="en-US" sz="1050" b="0" i="0" u="none" strike="noStrike" kern="1200" cap="none" spc="0" normalizeH="0" baseline="0" noProof="0" dirty="0">
+              <a:ln>
+                <a:noFill/>
+              </a:ln>
+              <a:solidFill>
+                <a:prstClr val="black"/>
+              </a:solidFill>
+              <a:effectLst/>
+              <a:uLnTx/>
+              <a:uFillTx/>
+              <a:latin typeface="Calibri" panose="020F0502020204030204"/>
+              <a:ea typeface="+mn-ea"/>
+              <a:cs typeface="+mn-cs"/>
+            </a:endParaRPr>
+          </a:p>
+        </p:txBody>
+      </p:sp>
+      <p:sp>
+        <p:nvSpPr>
+          <p:cNvPr id="17" name="Rechteck: abgerundete Ecken 16">
+            <a:extLst>
+              <a:ext uri="{FF2B5EF4-FFF2-40B4-BE49-F238E27FC236}">
+                <a16:creationId xmlns:a16="http://schemas.microsoft.com/office/drawing/2014/main" id="{A080EEB9-E5B1-4902-9734-C6F84DD47C8D}"/>
+              </a:ext>
+            </a:extLst>
+          </p:cNvPr>
+          <p:cNvSpPr/>
+          <p:nvPr/>
+        </p:nvSpPr>
+        <p:spPr>
+          <a:xfrm>
+            <a:off x="9366586" y="2715126"/>
+            <a:ext cx="1179094" cy="1203157"/>
+          </a:xfrm>
+          <a:prstGeom prst="roundRect">
+            <a:avLst>
+              <a:gd name="adj" fmla="val 7483"/>
+            </a:avLst>
+          </a:prstGeom>
+          <a:solidFill>
+            <a:schemeClr val="bg1">
+              <a:lumMod val="95000"/>
+            </a:schemeClr>
+          </a:solidFill>
+          <a:ln w="9525" cap="flat" cmpd="sng" algn="ctr">
+            <a:solidFill>
+              <a:schemeClr val="dk1"/>
+            </a:solidFill>
+            <a:prstDash val="solid"/>
+            <a:round/>
+            <a:headEnd type="none" w="med" len="med"/>
+            <a:tailEnd type="none" w="med" len="med"/>
+          </a:ln>
+        </p:spPr>
+        <p:style>
+          <a:lnRef idx="0">
+            <a:scrgbClr r="0" g="0" b="0"/>
+          </a:lnRef>
+          <a:fillRef idx="0">
+            <a:scrgbClr r="0" g="0" b="0"/>
+          </a:fillRef>
+          <a:effectRef idx="0">
+            <a:scrgbClr r="0" g="0" b="0"/>
+          </a:effectRef>
+          <a:fontRef idx="minor">
+            <a:schemeClr val="dk1"/>
+          </a:fontRef>
+        </p:style>
+        <p:txBody>
+          <a:bodyPr rot="0" spcFirstLastPara="0" vertOverflow="overflow" horzOverflow="overflow" vert="horz" wrap="square" lIns="91440" tIns="45720" rIns="91440" bIns="45720" numCol="1" spcCol="0" rtlCol="0" fromWordArt="0" anchor="ctr" anchorCtr="0" forceAA="0" compatLnSpc="1">
+            <a:prstTxWarp prst="textNoShape">
+              <a:avLst/>
+            </a:prstTxWarp>
+            <a:noAutofit/>
+          </a:bodyPr>
+          <a:lstStyle/>
+          <a:p>
+            <a:pPr marL="0" marR="0" lvl="0" indent="0" algn="ctr" defTabSz="914400" rtl="0" eaLnBrk="1" fontAlgn="auto" latinLnBrk="0" hangingPunct="1">
+              <a:lnSpc>
+                <a:spcPct val="100000"/>
+              </a:lnSpc>
+              <a:spcBef>
+                <a:spcPts val="0"/>
+              </a:spcBef>
+              <a:spcAft>
+                <a:spcPts val="0"/>
+              </a:spcAft>
+              <a:buClrTx/>
+              <a:buSzTx/>
+              <a:buFontTx/>
+              <a:buNone/>
+              <a:tabLst/>
+              <a:defRPr/>
+            </a:pPr>
+            <a:endParaRPr kumimoji="0" lang="en-US" sz="1050" b="0" i="0" u="none" strike="noStrike" kern="1200" cap="none" spc="0" normalizeH="0" baseline="0" noProof="0" dirty="0">
+              <a:ln>
+                <a:noFill/>
+              </a:ln>
+              <a:solidFill>
+                <a:prstClr val="black"/>
+              </a:solidFill>
+              <a:effectLst/>
+              <a:uLnTx/>
+              <a:uFillTx/>
+              <a:latin typeface="Calibri" panose="020F0502020204030204"/>
+              <a:ea typeface="+mn-ea"/>
+              <a:cs typeface="+mn-cs"/>
+            </a:endParaRPr>
+          </a:p>
+        </p:txBody>
+      </p:sp>
+      <p:cxnSp>
+        <p:nvCxnSpPr>
+          <p:cNvPr id="18" name="Gerade Verbindung mit Pfeil 17">
+            <a:extLst>
+              <a:ext uri="{FF2B5EF4-FFF2-40B4-BE49-F238E27FC236}">
+                <a16:creationId xmlns:a16="http://schemas.microsoft.com/office/drawing/2014/main" id="{884EBD93-4A52-4B56-A1EE-2BAB6FCA900C}"/>
+              </a:ext>
+            </a:extLst>
+          </p:cNvPr>
+          <p:cNvCxnSpPr>
+            <a:cxnSpLocks/>
+            <a:endCxn id="7" idx="3"/>
+          </p:cNvCxnSpPr>
+          <p:nvPr/>
+        </p:nvCxnSpPr>
+        <p:spPr>
+          <a:xfrm flipH="1">
+            <a:off x="6685547" y="3316706"/>
+            <a:ext cx="928440" cy="5236"/>
+          </a:xfrm>
+          <a:prstGeom prst="straightConnector1">
+            <a:avLst/>
+          </a:prstGeom>
+          <a:ln>
+            <a:tailEnd type="triangle"/>
+          </a:ln>
+        </p:spPr>
+        <p:style>
+          <a:lnRef idx="1">
+            <a:schemeClr val="dk1"/>
+          </a:lnRef>
+          <a:fillRef idx="0">
+            <a:schemeClr val="dk1"/>
+          </a:fillRef>
+          <a:effectRef idx="0">
+            <a:schemeClr val="dk1"/>
+          </a:effectRef>
+          <a:fontRef idx="minor">
+            <a:schemeClr val="tx1"/>
+          </a:fontRef>
+        </p:style>
+      </p:cxnSp>
+      <p:cxnSp>
+        <p:nvCxnSpPr>
+          <p:cNvPr id="27" name="Gerade Verbindung mit Pfeil 26">
+            <a:extLst>
+              <a:ext uri="{FF2B5EF4-FFF2-40B4-BE49-F238E27FC236}">
+                <a16:creationId xmlns:a16="http://schemas.microsoft.com/office/drawing/2014/main" id="{BD6F0311-3FCC-49F2-B56A-AC0B496C3C3E}"/>
+              </a:ext>
+            </a:extLst>
+          </p:cNvPr>
+          <p:cNvCxnSpPr>
+            <a:cxnSpLocks/>
+          </p:cNvCxnSpPr>
+          <p:nvPr/>
+        </p:nvCxnSpPr>
+        <p:spPr>
+          <a:xfrm flipH="1">
+            <a:off x="8793080" y="3316705"/>
+            <a:ext cx="573506" cy="1"/>
+          </a:xfrm>
+          <a:prstGeom prst="straightConnector1">
+            <a:avLst/>
+          </a:prstGeom>
+          <a:ln>
+            <a:tailEnd type="triangle"/>
+          </a:ln>
+        </p:spPr>
+        <p:style>
+          <a:lnRef idx="1">
+            <a:schemeClr val="accent1"/>
+          </a:lnRef>
+          <a:fillRef idx="0">
+            <a:schemeClr val="accent1"/>
+          </a:fillRef>
+          <a:effectRef idx="0">
+            <a:schemeClr val="accent1"/>
+          </a:effectRef>
+          <a:fontRef idx="minor">
+            <a:schemeClr val="tx1"/>
+          </a:fontRef>
+        </p:style>
+      </p:cxnSp>
+      <p:sp>
+        <p:nvSpPr>
+          <p:cNvPr id="33" name="Textfeld 32">
+            <a:extLst>
+              <a:ext uri="{FF2B5EF4-FFF2-40B4-BE49-F238E27FC236}">
+                <a16:creationId xmlns:a16="http://schemas.microsoft.com/office/drawing/2014/main" id="{8D8EF98B-E19B-4BA1-A102-51737F08FDAE}"/>
+              </a:ext>
+            </a:extLst>
+          </p:cNvPr>
+          <p:cNvSpPr txBox="1"/>
+          <p:nvPr/>
+        </p:nvSpPr>
+        <p:spPr>
+          <a:xfrm>
+            <a:off x="6603333" y="3108955"/>
+            <a:ext cx="1100890" cy="415498"/>
+          </a:xfrm>
+          <a:prstGeom prst="rect">
+            <a:avLst/>
+          </a:prstGeom>
+          <a:noFill/>
+        </p:spPr>
+        <p:txBody>
+          <a:bodyPr wrap="square" rtlCol="0">
+            <a:spAutoFit/>
+          </a:bodyPr>
+          <a:lstStyle/>
+          <a:p>
+            <a:pPr marL="0" marR="0" lvl="0" indent="0" algn="ctr" defTabSz="914400" rtl="0" eaLnBrk="1" fontAlgn="auto" latinLnBrk="0" hangingPunct="1">
+              <a:lnSpc>
+                <a:spcPct val="100000"/>
+              </a:lnSpc>
+              <a:spcBef>
+                <a:spcPts val="0"/>
+              </a:spcBef>
+              <a:spcAft>
+                <a:spcPts val="0"/>
+              </a:spcAft>
+              <a:buClrTx/>
+              <a:buSzTx/>
+              <a:buFontTx/>
+              <a:buNone/>
+              <a:tabLst/>
+              <a:defRPr/>
+            </a:pPr>
+            <a:r>
+              <a:rPr kumimoji="0" lang="de-DE" sz="1050" b="0" i="0" u="none" strike="noStrike" kern="1200" cap="none" spc="0" normalizeH="0" baseline="0" noProof="0" dirty="0" err="1">
+                <a:ln>
+                  <a:noFill/>
+                </a:ln>
+                <a:solidFill>
+                  <a:prstClr val="black"/>
+                </a:solidFill>
+                <a:effectLst/>
+                <a:uLnTx/>
+                <a:uFillTx/>
+                <a:latin typeface="Calibri" panose="020F0502020204030204"/>
+                <a:ea typeface="+mn-ea"/>
+                <a:cs typeface="+mn-cs"/>
+              </a:rPr>
+              <a:t>OpenMetrics</a:t>
+            </a:r>
+            <a:endParaRPr kumimoji="0" lang="de-DE" sz="1050" b="0" i="0" u="none" strike="noStrike" kern="1200" cap="none" spc="0" normalizeH="0" baseline="0" noProof="0" dirty="0">
+              <a:ln>
+                <a:noFill/>
+              </a:ln>
+              <a:solidFill>
+                <a:prstClr val="black"/>
+              </a:solidFill>
+              <a:effectLst/>
+              <a:uLnTx/>
+              <a:uFillTx/>
+              <a:latin typeface="Calibri" panose="020F0502020204030204"/>
+              <a:ea typeface="+mn-ea"/>
+              <a:cs typeface="+mn-cs"/>
+            </a:endParaRPr>
+          </a:p>
+          <a:p>
+            <a:pPr marL="0" marR="0" lvl="0" indent="0" algn="ctr" defTabSz="914400" rtl="0" eaLnBrk="1" fontAlgn="auto" latinLnBrk="0" hangingPunct="1">
+              <a:lnSpc>
+                <a:spcPct val="100000"/>
+              </a:lnSpc>
+              <a:spcBef>
+                <a:spcPts val="0"/>
+              </a:spcBef>
+              <a:spcAft>
+                <a:spcPts val="0"/>
+              </a:spcAft>
+              <a:buClrTx/>
+              <a:buSzTx/>
+              <a:buFontTx/>
+              <a:buNone/>
+              <a:tabLst/>
+              <a:defRPr/>
+            </a:pPr>
+            <a:r>
+              <a:rPr kumimoji="0" lang="de-DE" sz="1050" b="0" i="0" u="none" strike="noStrike" kern="1200" cap="none" spc="0" normalizeH="0" baseline="0" noProof="0" dirty="0" err="1">
+                <a:ln>
+                  <a:noFill/>
+                </a:ln>
+                <a:solidFill>
+                  <a:prstClr val="black"/>
+                </a:solidFill>
+                <a:effectLst/>
+                <a:uLnTx/>
+                <a:uFillTx/>
+                <a:latin typeface="Calibri" panose="020F0502020204030204"/>
+                <a:ea typeface="+mn-ea"/>
+                <a:cs typeface="+mn-cs"/>
+              </a:rPr>
+              <a:t>Srcape</a:t>
+            </a:r>
+            <a:endParaRPr kumimoji="0" lang="en-US" sz="1050" b="0" i="0" u="none" strike="noStrike" kern="1200" cap="none" spc="0" normalizeH="0" baseline="0" noProof="0" dirty="0">
+              <a:ln>
+                <a:noFill/>
+              </a:ln>
+              <a:solidFill>
+                <a:prstClr val="black"/>
+              </a:solidFill>
+              <a:effectLst/>
+              <a:uLnTx/>
+              <a:uFillTx/>
+              <a:latin typeface="Calibri" panose="020F0502020204030204"/>
+              <a:ea typeface="+mn-ea"/>
+              <a:cs typeface="+mn-cs"/>
+            </a:endParaRPr>
+          </a:p>
+        </p:txBody>
+      </p:sp>
+      <p:pic>
+        <p:nvPicPr>
+          <p:cNvPr id="37" name="Grafik 36">
+            <a:extLst>
+              <a:ext uri="{FF2B5EF4-FFF2-40B4-BE49-F238E27FC236}">
+                <a16:creationId xmlns:a16="http://schemas.microsoft.com/office/drawing/2014/main" id="{A6C67CCB-FE6B-416F-9AC9-7C6C05EB8656}"/>
+              </a:ext>
+            </a:extLst>
+          </p:cNvPr>
+          <p:cNvPicPr>
+            <a:picLocks noChangeAspect="1"/>
+          </p:cNvPicPr>
+          <p:nvPr/>
+        </p:nvPicPr>
+        <p:blipFill>
+          <a:blip r:embed="rId2">
+            <a:extLst>
+              <a:ext uri="{28A0092B-C50C-407E-A947-70E740481C1C}">
+                <a14:useLocalDpi xmlns:a14="http://schemas.microsoft.com/office/drawing/2010/main" val="0"/>
+              </a:ext>
+            </a:extLst>
+          </a:blip>
+          <a:stretch>
+            <a:fillRect/>
+          </a:stretch>
+        </p:blipFill>
+        <p:spPr>
+          <a:xfrm>
+            <a:off x="9366586" y="2776286"/>
+            <a:ext cx="1179094" cy="1080836"/>
+          </a:xfrm>
+          <a:prstGeom prst="rect">
+            <a:avLst/>
+          </a:prstGeom>
+        </p:spPr>
+      </p:pic>
+      <p:pic>
+        <p:nvPicPr>
+          <p:cNvPr id="39" name="Grafik 38">
+            <a:extLst>
+              <a:ext uri="{FF2B5EF4-FFF2-40B4-BE49-F238E27FC236}">
+                <a16:creationId xmlns:a16="http://schemas.microsoft.com/office/drawing/2014/main" id="{A58E5BD8-0EB2-4148-AB00-546299CD015F}"/>
+              </a:ext>
+            </a:extLst>
+          </p:cNvPr>
+          <p:cNvPicPr>
+            <a:picLocks noChangeAspect="1"/>
+          </p:cNvPicPr>
+          <p:nvPr/>
+        </p:nvPicPr>
+        <p:blipFill rotWithShape="1">
+          <a:blip r:embed="rId3">
+            <a:extLst>
+              <a:ext uri="{28A0092B-C50C-407E-A947-70E740481C1C}">
+                <a14:useLocalDpi xmlns:a14="http://schemas.microsoft.com/office/drawing/2010/main" val="0"/>
+              </a:ext>
+            </a:extLst>
+          </a:blip>
+          <a:srcRect b="32613"/>
+          <a:stretch/>
+        </p:blipFill>
+        <p:spPr>
+          <a:xfrm>
+            <a:off x="7659796" y="2958616"/>
+            <a:ext cx="1148554" cy="773979"/>
+          </a:xfrm>
+          <a:prstGeom prst="rect">
+            <a:avLst/>
+          </a:prstGeom>
+        </p:spPr>
+      </p:pic>
+      <p:sp>
+        <p:nvSpPr>
+          <p:cNvPr id="23" name="Rechteck: abgerundete Ecken 22">
+            <a:extLst>
+              <a:ext uri="{FF2B5EF4-FFF2-40B4-BE49-F238E27FC236}">
+                <a16:creationId xmlns:a16="http://schemas.microsoft.com/office/drawing/2014/main" id="{F6038EA7-9A6A-430F-8D9D-652ADF888DD8}"/>
+              </a:ext>
+            </a:extLst>
+          </p:cNvPr>
+          <p:cNvSpPr/>
+          <p:nvPr/>
+        </p:nvSpPr>
+        <p:spPr>
+          <a:xfrm>
+            <a:off x="3204310" y="2720363"/>
+            <a:ext cx="1179094" cy="1203157"/>
+          </a:xfrm>
+          <a:prstGeom prst="roundRect">
+            <a:avLst>
+              <a:gd name="adj" fmla="val 5761"/>
+            </a:avLst>
+          </a:prstGeom>
+          <a:solidFill>
+            <a:schemeClr val="bg1">
+              <a:lumMod val="95000"/>
+            </a:schemeClr>
+          </a:solidFill>
+          <a:ln w="9525" cap="flat" cmpd="sng" algn="ctr">
+            <a:solidFill>
+              <a:schemeClr val="dk1"/>
+            </a:solidFill>
+            <a:prstDash val="solid"/>
+            <a:round/>
+            <a:headEnd type="none" w="med" len="med"/>
+            <a:tailEnd type="none" w="med" len="med"/>
+          </a:ln>
+        </p:spPr>
+        <p:style>
+          <a:lnRef idx="0">
+            <a:scrgbClr r="0" g="0" b="0"/>
+          </a:lnRef>
+          <a:fillRef idx="0">
+            <a:scrgbClr r="0" g="0" b="0"/>
+          </a:fillRef>
+          <a:effectRef idx="0">
+            <a:scrgbClr r="0" g="0" b="0"/>
+          </a:effectRef>
+          <a:fontRef idx="minor">
+            <a:schemeClr val="dk1"/>
+          </a:fontRef>
+        </p:style>
+        <p:txBody>
+          <a:bodyPr rot="0" spcFirstLastPara="0" vertOverflow="overflow" horzOverflow="overflow" vert="horz" wrap="square" lIns="91440" tIns="45720" rIns="91440" bIns="45720" numCol="1" spcCol="0" rtlCol="0" fromWordArt="0" anchor="ctr" anchorCtr="0" forceAA="0" compatLnSpc="1">
+            <a:prstTxWarp prst="textNoShape">
+              <a:avLst/>
+            </a:prstTxWarp>
+            <a:noAutofit/>
+          </a:bodyPr>
+          <a:lstStyle/>
+          <a:p>
+            <a:pPr marL="0" marR="0" lvl="0" indent="0" algn="ctr" defTabSz="914400" rtl="0" eaLnBrk="1" fontAlgn="auto" latinLnBrk="0" hangingPunct="1">
+              <a:lnSpc>
+                <a:spcPct val="100000"/>
+              </a:lnSpc>
+              <a:spcBef>
+                <a:spcPts val="0"/>
+              </a:spcBef>
+              <a:spcAft>
+                <a:spcPts val="0"/>
+              </a:spcAft>
+              <a:buClrTx/>
+              <a:buSzTx/>
+              <a:buFontTx/>
+              <a:buNone/>
+              <a:tabLst/>
+              <a:defRPr/>
+            </a:pPr>
+            <a:r>
+              <a:rPr kumimoji="0" lang="de-DE" sz="1200" b="1" i="0" u="none" strike="noStrike" kern="1200" cap="none" spc="0" normalizeH="0" baseline="0" noProof="0" dirty="0">
+                <a:ln>
+                  <a:noFill/>
+                </a:ln>
+                <a:solidFill>
+                  <a:prstClr val="black"/>
+                </a:solidFill>
+                <a:effectLst/>
+                <a:uLnTx/>
+                <a:uFillTx/>
+                <a:latin typeface="Calibri" panose="020F0502020204030204"/>
+                <a:ea typeface="+mn-ea"/>
+                <a:cs typeface="+mn-cs"/>
+              </a:rPr>
+              <a:t>Admin </a:t>
+            </a:r>
+            <a:r>
+              <a:rPr kumimoji="0" lang="de-DE" sz="1200" b="1" i="0" u="none" strike="noStrike" kern="1200" cap="none" spc="0" normalizeH="0" baseline="0" noProof="0" dirty="0" err="1">
+                <a:ln>
+                  <a:noFill/>
+                </a:ln>
+                <a:solidFill>
+                  <a:prstClr val="black"/>
+                </a:solidFill>
+                <a:effectLst/>
+                <a:uLnTx/>
+                <a:uFillTx/>
+                <a:latin typeface="Calibri" panose="020F0502020204030204"/>
+                <a:ea typeface="+mn-ea"/>
+                <a:cs typeface="+mn-cs"/>
+              </a:rPr>
+              <a:t>Node</a:t>
+            </a:r>
+            <a:r>
+              <a:rPr kumimoji="0" lang="de-DE" sz="1200" b="1" i="0" u="none" strike="noStrike" kern="1200" cap="none" spc="0" normalizeH="0" baseline="0" noProof="0" dirty="0">
+                <a:ln>
+                  <a:noFill/>
+                </a:ln>
+                <a:solidFill>
+                  <a:prstClr val="black"/>
+                </a:solidFill>
+                <a:effectLst/>
+                <a:uLnTx/>
+                <a:uFillTx/>
+                <a:latin typeface="Calibri" panose="020F0502020204030204"/>
+                <a:ea typeface="+mn-ea"/>
+                <a:cs typeface="+mn-cs"/>
+              </a:rPr>
+              <a:t>-Manager</a:t>
+            </a:r>
+            <a:endParaRPr kumimoji="0" lang="en-US" sz="1050" b="0" i="0" u="none" strike="noStrike" kern="1200" cap="none" spc="0" normalizeH="0" baseline="0" noProof="0" dirty="0">
+              <a:ln>
+                <a:noFill/>
+              </a:ln>
+              <a:solidFill>
+                <a:prstClr val="black"/>
+              </a:solidFill>
+              <a:effectLst/>
+              <a:uLnTx/>
+              <a:uFillTx/>
+              <a:latin typeface="Calibri" panose="020F0502020204030204"/>
+              <a:ea typeface="+mn-ea"/>
+              <a:cs typeface="+mn-cs"/>
+            </a:endParaRPr>
+          </a:p>
+        </p:txBody>
+      </p:sp>
+      <p:cxnSp>
+        <p:nvCxnSpPr>
+          <p:cNvPr id="31" name="Gerade Verbindung mit Pfeil 30">
+            <a:extLst>
+              <a:ext uri="{FF2B5EF4-FFF2-40B4-BE49-F238E27FC236}">
+                <a16:creationId xmlns:a16="http://schemas.microsoft.com/office/drawing/2014/main" id="{EF2946EE-CE63-45E1-A28A-24D25F38EC4B}"/>
+              </a:ext>
+            </a:extLst>
+          </p:cNvPr>
+          <p:cNvCxnSpPr>
+            <a:cxnSpLocks/>
+            <a:stCxn id="23" idx="1"/>
+            <a:endCxn id="5" idx="3"/>
+          </p:cNvCxnSpPr>
+          <p:nvPr/>
+        </p:nvCxnSpPr>
+        <p:spPr>
+          <a:xfrm flipH="1">
+            <a:off x="2486522" y="3321942"/>
+            <a:ext cx="717788" cy="704627"/>
+          </a:xfrm>
+          <a:prstGeom prst="straightConnector1">
+            <a:avLst/>
+          </a:prstGeom>
+          <a:ln>
+            <a:tailEnd type="triangle"/>
+          </a:ln>
+        </p:spPr>
+        <p:style>
+          <a:lnRef idx="1">
+            <a:schemeClr val="dk1"/>
+          </a:lnRef>
+          <a:fillRef idx="0">
+            <a:schemeClr val="dk1"/>
+          </a:fillRef>
+          <a:effectRef idx="0">
+            <a:schemeClr val="dk1"/>
+          </a:effectRef>
+          <a:fontRef idx="minor">
+            <a:schemeClr val="tx1"/>
+          </a:fontRef>
+        </p:style>
+      </p:cxnSp>
+      <p:sp>
+        <p:nvSpPr>
+          <p:cNvPr id="34" name="Textfeld 33">
+            <a:extLst>
+              <a:ext uri="{FF2B5EF4-FFF2-40B4-BE49-F238E27FC236}">
+                <a16:creationId xmlns:a16="http://schemas.microsoft.com/office/drawing/2014/main" id="{8BA6CE8A-EE48-4C35-AAA7-793325DC28E6}"/>
+              </a:ext>
+            </a:extLst>
+          </p:cNvPr>
+          <p:cNvSpPr txBox="1"/>
+          <p:nvPr/>
+        </p:nvSpPr>
+        <p:spPr>
+          <a:xfrm rot="18900000">
+            <a:off x="2512105" y="3403817"/>
+            <a:ext cx="686304" cy="253916"/>
+          </a:xfrm>
+          <a:prstGeom prst="rect">
+            <a:avLst/>
+          </a:prstGeom>
+          <a:noFill/>
+        </p:spPr>
+        <p:txBody>
+          <a:bodyPr wrap="square" rtlCol="0">
+            <a:spAutoFit/>
+          </a:bodyPr>
+          <a:lstStyle/>
+          <a:p>
+            <a:pPr marL="0" marR="0" lvl="0" indent="0" algn="ctr" defTabSz="914400" rtl="0" eaLnBrk="1" fontAlgn="auto" latinLnBrk="0" hangingPunct="1">
+              <a:lnSpc>
+                <a:spcPct val="100000"/>
+              </a:lnSpc>
+              <a:spcBef>
+                <a:spcPts val="0"/>
+              </a:spcBef>
+              <a:spcAft>
+                <a:spcPts val="0"/>
+              </a:spcAft>
+              <a:buClrTx/>
+              <a:buSzTx/>
+              <a:buFontTx/>
+              <a:buNone/>
+              <a:tabLst/>
+              <a:defRPr/>
+            </a:pPr>
+            <a:r>
+              <a:rPr kumimoji="0" lang="de-DE" sz="1050" b="0" i="0" u="none" strike="noStrike" kern="1200" cap="none" spc="0" normalizeH="0" baseline="0" noProof="0" dirty="0">
+                <a:ln>
+                  <a:noFill/>
+                </a:ln>
+                <a:solidFill>
+                  <a:prstClr val="black"/>
+                </a:solidFill>
+                <a:effectLst/>
+                <a:uLnTx/>
+                <a:uFillTx/>
+                <a:latin typeface="Calibri" panose="020F0502020204030204"/>
+                <a:ea typeface="+mn-ea"/>
+                <a:cs typeface="+mn-cs"/>
+              </a:rPr>
+              <a:t>HTTPS</a:t>
+            </a:r>
+            <a:endParaRPr kumimoji="0" lang="en-US" sz="1050" b="0" i="0" u="none" strike="noStrike" kern="1200" cap="none" spc="0" normalizeH="0" baseline="0" noProof="0" dirty="0">
+              <a:ln>
+                <a:noFill/>
+              </a:ln>
+              <a:solidFill>
+                <a:prstClr val="black"/>
+              </a:solidFill>
+              <a:effectLst/>
+              <a:uLnTx/>
+              <a:uFillTx/>
+              <a:latin typeface="Calibri" panose="020F0502020204030204"/>
+              <a:ea typeface="+mn-ea"/>
+              <a:cs typeface="+mn-cs"/>
+            </a:endParaRPr>
+          </a:p>
+        </p:txBody>
+      </p:sp>
+      <p:sp>
+        <p:nvSpPr>
+          <p:cNvPr id="35" name="Textfeld 34">
+            <a:extLst>
+              <a:ext uri="{FF2B5EF4-FFF2-40B4-BE49-F238E27FC236}">
+                <a16:creationId xmlns:a16="http://schemas.microsoft.com/office/drawing/2014/main" id="{C85109B3-3365-41B2-A9DF-AF54546469BE}"/>
+              </a:ext>
+            </a:extLst>
+          </p:cNvPr>
+          <p:cNvSpPr txBox="1"/>
+          <p:nvPr/>
+        </p:nvSpPr>
+        <p:spPr>
+          <a:xfrm rot="16200000">
+            <a:off x="3912633" y="3130484"/>
+            <a:ext cx="955318" cy="415498"/>
+          </a:xfrm>
+          <a:prstGeom prst="rect">
+            <a:avLst/>
+          </a:prstGeom>
+          <a:noFill/>
+        </p:spPr>
+        <p:txBody>
+          <a:bodyPr wrap="square" rtlCol="0">
+            <a:spAutoFit/>
+          </a:bodyPr>
+          <a:lstStyle/>
+          <a:p>
+            <a:pPr algn="ctr"/>
+            <a:r>
+              <a:rPr lang="de-DE" sz="1050" dirty="0"/>
+              <a:t>Monitoring REST   - API</a:t>
+            </a:r>
+            <a:endParaRPr lang="en-US" sz="1050" dirty="0"/>
+          </a:p>
+        </p:txBody>
+      </p:sp>
+    </p:spTree>
+    <p:extLst>
+      <p:ext uri="{BB962C8B-B14F-4D97-AF65-F5344CB8AC3E}">
+        <p14:creationId xmlns:p14="http://schemas.microsoft.com/office/powerpoint/2010/main" val="2729437769"/>
+      </p:ext>
+    </p:extLst>
+  </p:cSld>
+  <p:clrMapOvr>
+    <a:masterClrMapping/>
+  </p:clrMapOvr>
+</p:sld>
+</file>
+
 <file path=ppt/theme/theme1.xml><?xml version="1.0" encoding="utf-8"?>
 <a:theme xmlns:a="http://schemas.openxmlformats.org/drawingml/2006/main" name="Office">
   <a:themeElements>

</xml_diff>